<commit_message>
Vs Code ile github a dosya gönderme eklendi
</commit_message>
<xml_diff>
--- a/Git ve GitHub Kullanımı.pptx
+++ b/Git ve GitHub Kullanımı.pptx
@@ -24,6 +24,16 @@
     <p:sldId id="271" r:id="rId18"/>
     <p:sldId id="272" r:id="rId19"/>
     <p:sldId id="273" r:id="rId20"/>
+    <p:sldId id="285" r:id="rId21"/>
+    <p:sldId id="277" r:id="rId22"/>
+    <p:sldId id="278" r:id="rId23"/>
+    <p:sldId id="279" r:id="rId24"/>
+    <p:sldId id="280" r:id="rId25"/>
+    <p:sldId id="281" r:id="rId26"/>
+    <p:sldId id="282" r:id="rId27"/>
+    <p:sldId id="283" r:id="rId28"/>
+    <p:sldId id="284" r:id="rId29"/>
+    <p:sldId id="286" r:id="rId30"/>
   </p:sldIdLst>
   <p:sldSz cx="12192000" cy="6858000"/>
   <p:notesSz cx="6858000" cy="9144000"/>
@@ -152,6 +162,20 @@
             <p14:sldId id="273"/>
           </p14:sldIdLst>
         </p14:section>
+        <p14:section name="VS Code" id="{D9027851-4B28-4368-9C19-0E0DF1D70469}">
+          <p14:sldIdLst>
+            <p14:sldId id="285"/>
+            <p14:sldId id="277"/>
+            <p14:sldId id="278"/>
+            <p14:sldId id="279"/>
+            <p14:sldId id="280"/>
+            <p14:sldId id="281"/>
+            <p14:sldId id="282"/>
+            <p14:sldId id="283"/>
+            <p14:sldId id="284"/>
+            <p14:sldId id="286"/>
+          </p14:sldIdLst>
+        </p14:section>
       </p14:sectionLst>
     </p:ext>
     <p:ext uri="{EFAFB233-063F-42B5-8137-9DF3F51BA10A}">
@@ -308,7 +332,7 @@
           <a:p>
             <a:fld id="{4105493D-33AA-4146-9915-4CFC74D2DF19}" type="datetimeFigureOut">
               <a:rPr lang="tr-TR" smtClean="0"/>
-              <a:t>7.03.2021</a:t>
+              <a:t>12.03.2021</a:t>
             </a:fld>
             <a:endParaRPr lang="tr-TR"/>
           </a:p>
@@ -506,7 +530,7 @@
           <a:p>
             <a:fld id="{4105493D-33AA-4146-9915-4CFC74D2DF19}" type="datetimeFigureOut">
               <a:rPr lang="tr-TR" smtClean="0"/>
-              <a:t>7.03.2021</a:t>
+              <a:t>12.03.2021</a:t>
             </a:fld>
             <a:endParaRPr lang="tr-TR"/>
           </a:p>
@@ -714,7 +738,7 @@
           <a:p>
             <a:fld id="{4105493D-33AA-4146-9915-4CFC74D2DF19}" type="datetimeFigureOut">
               <a:rPr lang="tr-TR" smtClean="0"/>
-              <a:t>7.03.2021</a:t>
+              <a:t>12.03.2021</a:t>
             </a:fld>
             <a:endParaRPr lang="tr-TR"/>
           </a:p>
@@ -912,7 +936,7 @@
           <a:p>
             <a:fld id="{4105493D-33AA-4146-9915-4CFC74D2DF19}" type="datetimeFigureOut">
               <a:rPr lang="tr-TR" smtClean="0"/>
-              <a:t>7.03.2021</a:t>
+              <a:t>12.03.2021</a:t>
             </a:fld>
             <a:endParaRPr lang="tr-TR"/>
           </a:p>
@@ -1187,7 +1211,7 @@
           <a:p>
             <a:fld id="{4105493D-33AA-4146-9915-4CFC74D2DF19}" type="datetimeFigureOut">
               <a:rPr lang="tr-TR" smtClean="0"/>
-              <a:t>7.03.2021</a:t>
+              <a:t>12.03.2021</a:t>
             </a:fld>
             <a:endParaRPr lang="tr-TR"/>
           </a:p>
@@ -1452,7 +1476,7 @@
           <a:p>
             <a:fld id="{4105493D-33AA-4146-9915-4CFC74D2DF19}" type="datetimeFigureOut">
               <a:rPr lang="tr-TR" smtClean="0"/>
-              <a:t>7.03.2021</a:t>
+              <a:t>12.03.2021</a:t>
             </a:fld>
             <a:endParaRPr lang="tr-TR"/>
           </a:p>
@@ -1864,7 +1888,7 @@
           <a:p>
             <a:fld id="{4105493D-33AA-4146-9915-4CFC74D2DF19}" type="datetimeFigureOut">
               <a:rPr lang="tr-TR" smtClean="0"/>
-              <a:t>7.03.2021</a:t>
+              <a:t>12.03.2021</a:t>
             </a:fld>
             <a:endParaRPr lang="tr-TR"/>
           </a:p>
@@ -2005,7 +2029,7 @@
           <a:p>
             <a:fld id="{4105493D-33AA-4146-9915-4CFC74D2DF19}" type="datetimeFigureOut">
               <a:rPr lang="tr-TR" smtClean="0"/>
-              <a:t>7.03.2021</a:t>
+              <a:t>12.03.2021</a:t>
             </a:fld>
             <a:endParaRPr lang="tr-TR"/>
           </a:p>
@@ -2118,7 +2142,7 @@
           <a:p>
             <a:fld id="{4105493D-33AA-4146-9915-4CFC74D2DF19}" type="datetimeFigureOut">
               <a:rPr lang="tr-TR" smtClean="0"/>
-              <a:t>7.03.2021</a:t>
+              <a:t>12.03.2021</a:t>
             </a:fld>
             <a:endParaRPr lang="tr-TR"/>
           </a:p>
@@ -2429,7 +2453,7 @@
           <a:p>
             <a:fld id="{4105493D-33AA-4146-9915-4CFC74D2DF19}" type="datetimeFigureOut">
               <a:rPr lang="tr-TR" smtClean="0"/>
-              <a:t>7.03.2021</a:t>
+              <a:t>12.03.2021</a:t>
             </a:fld>
             <a:endParaRPr lang="tr-TR"/>
           </a:p>
@@ -2717,7 +2741,7 @@
           <a:p>
             <a:fld id="{4105493D-33AA-4146-9915-4CFC74D2DF19}" type="datetimeFigureOut">
               <a:rPr lang="tr-TR" smtClean="0"/>
-              <a:t>7.03.2021</a:t>
+              <a:t>12.03.2021</a:t>
             </a:fld>
             <a:endParaRPr lang="tr-TR"/>
           </a:p>
@@ -2958,7 +2982,7 @@
           <a:p>
             <a:fld id="{4105493D-33AA-4146-9915-4CFC74D2DF19}" type="datetimeFigureOut">
               <a:rPr lang="tr-TR" smtClean="0"/>
-              <a:t>7.03.2021</a:t>
+              <a:t>12.03.2021</a:t>
             </a:fld>
             <a:endParaRPr lang="tr-TR"/>
           </a:p>
@@ -5438,6 +5462,991 @@
 </p:sld>
 </file>
 
+<file path=ppt/slides/slide20.xml><?xml version="1.0" encoding="utf-8"?>
+<p:sld xmlns:a="http://schemas.openxmlformats.org/drawingml/2006/main" xmlns:r="http://schemas.openxmlformats.org/officeDocument/2006/relationships" xmlns:p="http://schemas.openxmlformats.org/presentationml/2006/main">
+  <p:cSld>
+    <p:spTree>
+      <p:nvGrpSpPr>
+        <p:cNvPr id="1" name=""/>
+        <p:cNvGrpSpPr/>
+        <p:nvPr/>
+      </p:nvGrpSpPr>
+      <p:grpSpPr>
+        <a:xfrm>
+          <a:off x="0" y="0"/>
+          <a:ext cx="0" cy="0"/>
+          <a:chOff x="0" y="0"/>
+          <a:chExt cx="0" cy="0"/>
+        </a:xfrm>
+      </p:grpSpPr>
+      <p:sp>
+        <p:nvSpPr>
+          <p:cNvPr id="5" name="Metin kutusu 4">
+            <a:extLst>
+              <a:ext uri="{FF2B5EF4-FFF2-40B4-BE49-F238E27FC236}">
+                <a16:creationId xmlns:a16="http://schemas.microsoft.com/office/drawing/2014/main" id="{999413EE-EE08-498C-9723-CA2CA07EAC93}"/>
+              </a:ext>
+            </a:extLst>
+          </p:cNvPr>
+          <p:cNvSpPr txBox="1"/>
+          <p:nvPr/>
+        </p:nvSpPr>
+        <p:spPr>
+          <a:xfrm>
+            <a:off x="834887" y="557455"/>
+            <a:ext cx="6096000" cy="923330"/>
+          </a:xfrm>
+          <a:prstGeom prst="rect">
+            <a:avLst/>
+          </a:prstGeom>
+          <a:noFill/>
+        </p:spPr>
+        <p:txBody>
+          <a:bodyPr wrap="square">
+            <a:spAutoFit/>
+          </a:bodyPr>
+          <a:lstStyle/>
+          <a:p>
+            <a:r>
+              <a:rPr lang="tr-TR" dirty="0">
+                <a:hlinkClick r:id="rId2"/>
+              </a:rPr>
+              <a:t>https://desktop.github.com/</a:t>
+            </a:r>
+            <a:endParaRPr lang="tr-TR" dirty="0"/>
+          </a:p>
+          <a:p>
+            <a:endParaRPr lang="tr-TR" dirty="0"/>
+          </a:p>
+          <a:p>
+            <a:r>
+              <a:rPr lang="tr-TR" dirty="0"/>
+              <a:t>adresinden programı indir ve kur.</a:t>
+            </a:r>
+          </a:p>
+        </p:txBody>
+      </p:sp>
+    </p:spTree>
+    <p:extLst>
+      <p:ext uri="{BB962C8B-B14F-4D97-AF65-F5344CB8AC3E}">
+        <p14:creationId xmlns:p14="http://schemas.microsoft.com/office/powerpoint/2010/main" val="2704659620"/>
+      </p:ext>
+    </p:extLst>
+  </p:cSld>
+  <p:clrMapOvr>
+    <a:masterClrMapping/>
+  </p:clrMapOvr>
+</p:sld>
+</file>
+
+<file path=ppt/slides/slide21.xml><?xml version="1.0" encoding="utf-8"?>
+<p:sld xmlns:a="http://schemas.openxmlformats.org/drawingml/2006/main" xmlns:r="http://schemas.openxmlformats.org/officeDocument/2006/relationships" xmlns:p="http://schemas.openxmlformats.org/presentationml/2006/main">
+  <p:cSld>
+    <p:spTree>
+      <p:nvGrpSpPr>
+        <p:cNvPr id="1" name=""/>
+        <p:cNvGrpSpPr/>
+        <p:nvPr/>
+      </p:nvGrpSpPr>
+      <p:grpSpPr>
+        <a:xfrm>
+          <a:off x="0" y="0"/>
+          <a:ext cx="0" cy="0"/>
+          <a:chOff x="0" y="0"/>
+          <a:chExt cx="0" cy="0"/>
+        </a:xfrm>
+      </p:grpSpPr>
+      <p:sp>
+        <p:nvSpPr>
+          <p:cNvPr id="4" name="Metin kutusu 3">
+            <a:extLst>
+              <a:ext uri="{FF2B5EF4-FFF2-40B4-BE49-F238E27FC236}">
+                <a16:creationId xmlns:a16="http://schemas.microsoft.com/office/drawing/2014/main" id="{B86DDD89-62C8-42DB-9BE5-0BACD8F43771}"/>
+              </a:ext>
+            </a:extLst>
+          </p:cNvPr>
+          <p:cNvSpPr txBox="1"/>
+          <p:nvPr/>
+        </p:nvSpPr>
+        <p:spPr>
+          <a:xfrm>
+            <a:off x="160861" y="183288"/>
+            <a:ext cx="5127942" cy="1477328"/>
+          </a:xfrm>
+          <a:prstGeom prst="rect">
+            <a:avLst/>
+          </a:prstGeom>
+          <a:noFill/>
+        </p:spPr>
+        <p:txBody>
+          <a:bodyPr wrap="none" rtlCol="0">
+            <a:spAutoFit/>
+          </a:bodyPr>
+          <a:lstStyle/>
+          <a:p>
+            <a:r>
+              <a:rPr lang="tr-TR" dirty="0"/>
+              <a:t>KODLARIN HIZLI BİR ŞEKİLDE GITHUB A YÜKLENMESİ:</a:t>
+            </a:r>
+          </a:p>
+          <a:p>
+            <a:endParaRPr lang="tr-TR" dirty="0"/>
+          </a:p>
+          <a:p>
+            <a:r>
+              <a:rPr lang="tr-TR" dirty="0"/>
+              <a:t>Open </a:t>
+            </a:r>
+            <a:r>
+              <a:rPr lang="tr-TR" dirty="0" err="1"/>
+              <a:t>Folder</a:t>
+            </a:r>
+            <a:endParaRPr lang="tr-TR" dirty="0"/>
+          </a:p>
+          <a:p>
+            <a:endParaRPr lang="tr-TR" dirty="0"/>
+          </a:p>
+          <a:p>
+            <a:r>
+              <a:rPr lang="tr-TR" dirty="0"/>
+              <a:t>işleminden sonra sağdaki adımları takip edin.</a:t>
+            </a:r>
+          </a:p>
+        </p:txBody>
+      </p:sp>
+      <p:pic>
+        <p:nvPicPr>
+          <p:cNvPr id="6" name="Resim 5">
+            <a:extLst>
+              <a:ext uri="{FF2B5EF4-FFF2-40B4-BE49-F238E27FC236}">
+                <a16:creationId xmlns:a16="http://schemas.microsoft.com/office/drawing/2014/main" id="{D97E4A5F-288B-457E-A97C-02B88DF7144A}"/>
+              </a:ext>
+            </a:extLst>
+          </p:cNvPr>
+          <p:cNvPicPr>
+            <a:picLocks noChangeAspect="1"/>
+          </p:cNvPicPr>
+          <p:nvPr/>
+        </p:nvPicPr>
+        <p:blipFill rotWithShape="1">
+          <a:blip r:embed="rId2"/>
+          <a:srcRect l="-193" t="-48" r="38039" b="25140"/>
+          <a:stretch/>
+        </p:blipFill>
+        <p:spPr>
+          <a:xfrm>
+            <a:off x="4614203" y="1540004"/>
+            <a:ext cx="7577797" cy="5134708"/>
+          </a:xfrm>
+          <a:prstGeom prst="rect">
+            <a:avLst/>
+          </a:prstGeom>
+        </p:spPr>
+      </p:pic>
+    </p:spTree>
+    <p:extLst>
+      <p:ext uri="{BB962C8B-B14F-4D97-AF65-F5344CB8AC3E}">
+        <p14:creationId xmlns:p14="http://schemas.microsoft.com/office/powerpoint/2010/main" val="2316937940"/>
+      </p:ext>
+    </p:extLst>
+  </p:cSld>
+  <p:clrMapOvr>
+    <a:masterClrMapping/>
+  </p:clrMapOvr>
+</p:sld>
+</file>
+
+<file path=ppt/slides/slide22.xml><?xml version="1.0" encoding="utf-8"?>
+<p:sld xmlns:a="http://schemas.openxmlformats.org/drawingml/2006/main" xmlns:r="http://schemas.openxmlformats.org/officeDocument/2006/relationships" xmlns:p="http://schemas.openxmlformats.org/presentationml/2006/main">
+  <p:cSld>
+    <p:spTree>
+      <p:nvGrpSpPr>
+        <p:cNvPr id="1" name=""/>
+        <p:cNvGrpSpPr/>
+        <p:nvPr/>
+      </p:nvGrpSpPr>
+      <p:grpSpPr>
+        <a:xfrm>
+          <a:off x="0" y="0"/>
+          <a:ext cx="0" cy="0"/>
+          <a:chOff x="0" y="0"/>
+          <a:chExt cx="0" cy="0"/>
+        </a:xfrm>
+      </p:grpSpPr>
+      <p:pic>
+        <p:nvPicPr>
+          <p:cNvPr id="5" name="Resim 4">
+            <a:extLst>
+              <a:ext uri="{FF2B5EF4-FFF2-40B4-BE49-F238E27FC236}">
+                <a16:creationId xmlns:a16="http://schemas.microsoft.com/office/drawing/2014/main" id="{35CAD767-4B9C-4E99-B494-2AC5A54BC1D0}"/>
+              </a:ext>
+            </a:extLst>
+          </p:cNvPr>
+          <p:cNvPicPr>
+            <a:picLocks noChangeAspect="1"/>
+          </p:cNvPicPr>
+          <p:nvPr/>
+        </p:nvPicPr>
+        <p:blipFill rotWithShape="1">
+          <a:blip r:embed="rId2"/>
+          <a:srcRect l="19130" r="14674"/>
+          <a:stretch/>
+        </p:blipFill>
+        <p:spPr>
+          <a:xfrm>
+            <a:off x="0" y="0"/>
+            <a:ext cx="8070575" cy="6854653"/>
+          </a:xfrm>
+          <a:prstGeom prst="rect">
+            <a:avLst/>
+          </a:prstGeom>
+        </p:spPr>
+      </p:pic>
+      <p:pic>
+        <p:nvPicPr>
+          <p:cNvPr id="7" name="Resim 6">
+            <a:extLst>
+              <a:ext uri="{FF2B5EF4-FFF2-40B4-BE49-F238E27FC236}">
+                <a16:creationId xmlns:a16="http://schemas.microsoft.com/office/drawing/2014/main" id="{94554C0E-F59B-41CC-A618-A9456AB4EA91}"/>
+              </a:ext>
+            </a:extLst>
+          </p:cNvPr>
+          <p:cNvPicPr>
+            <a:picLocks noChangeAspect="1"/>
+          </p:cNvPicPr>
+          <p:nvPr/>
+        </p:nvPicPr>
+        <p:blipFill rotWithShape="1">
+          <a:blip r:embed="rId3"/>
+          <a:srcRect l="37614" r="33805"/>
+          <a:stretch/>
+        </p:blipFill>
+        <p:spPr>
+          <a:xfrm>
+            <a:off x="8707493" y="3347"/>
+            <a:ext cx="3484507" cy="6854653"/>
+          </a:xfrm>
+          <a:prstGeom prst="rect">
+            <a:avLst/>
+          </a:prstGeom>
+        </p:spPr>
+      </p:pic>
+    </p:spTree>
+    <p:extLst>
+      <p:ext uri="{BB962C8B-B14F-4D97-AF65-F5344CB8AC3E}">
+        <p14:creationId xmlns:p14="http://schemas.microsoft.com/office/powerpoint/2010/main" val="4125892578"/>
+      </p:ext>
+    </p:extLst>
+  </p:cSld>
+  <p:clrMapOvr>
+    <a:masterClrMapping/>
+  </p:clrMapOvr>
+</p:sld>
+</file>
+
+<file path=ppt/slides/slide23.xml><?xml version="1.0" encoding="utf-8"?>
+<p:sld xmlns:a="http://schemas.openxmlformats.org/drawingml/2006/main" xmlns:r="http://schemas.openxmlformats.org/officeDocument/2006/relationships" xmlns:p="http://schemas.openxmlformats.org/presentationml/2006/main">
+  <p:cSld>
+    <p:spTree>
+      <p:nvGrpSpPr>
+        <p:cNvPr id="1" name=""/>
+        <p:cNvGrpSpPr/>
+        <p:nvPr/>
+      </p:nvGrpSpPr>
+      <p:grpSpPr>
+        <a:xfrm>
+          <a:off x="0" y="0"/>
+          <a:ext cx="0" cy="0"/>
+          <a:chOff x="0" y="0"/>
+          <a:chExt cx="0" cy="0"/>
+        </a:xfrm>
+      </p:grpSpPr>
+      <p:pic>
+        <p:nvPicPr>
+          <p:cNvPr id="3" name="Resim 2">
+            <a:extLst>
+              <a:ext uri="{FF2B5EF4-FFF2-40B4-BE49-F238E27FC236}">
+                <a16:creationId xmlns:a16="http://schemas.microsoft.com/office/drawing/2014/main" id="{F6491D17-72C8-4030-B385-92867051CD05}"/>
+              </a:ext>
+            </a:extLst>
+          </p:cNvPr>
+          <p:cNvPicPr>
+            <a:picLocks noChangeAspect="1"/>
+          </p:cNvPicPr>
+          <p:nvPr/>
+        </p:nvPicPr>
+        <p:blipFill>
+          <a:blip r:embed="rId2"/>
+          <a:stretch>
+            <a:fillRect/>
+          </a:stretch>
+        </p:blipFill>
+        <p:spPr>
+          <a:xfrm>
+            <a:off x="0" y="1673"/>
+            <a:ext cx="12192000" cy="6854653"/>
+          </a:xfrm>
+          <a:prstGeom prst="rect">
+            <a:avLst/>
+          </a:prstGeom>
+        </p:spPr>
+      </p:pic>
+    </p:spTree>
+    <p:extLst>
+      <p:ext uri="{BB962C8B-B14F-4D97-AF65-F5344CB8AC3E}">
+        <p14:creationId xmlns:p14="http://schemas.microsoft.com/office/powerpoint/2010/main" val="3831892750"/>
+      </p:ext>
+    </p:extLst>
+  </p:cSld>
+  <p:clrMapOvr>
+    <a:masterClrMapping/>
+  </p:clrMapOvr>
+</p:sld>
+</file>
+
+<file path=ppt/slides/slide24.xml><?xml version="1.0" encoding="utf-8"?>
+<p:sld xmlns:a="http://schemas.openxmlformats.org/drawingml/2006/main" xmlns:r="http://schemas.openxmlformats.org/officeDocument/2006/relationships" xmlns:p="http://schemas.openxmlformats.org/presentationml/2006/main">
+  <p:cSld>
+    <p:spTree>
+      <p:nvGrpSpPr>
+        <p:cNvPr id="1" name=""/>
+        <p:cNvGrpSpPr/>
+        <p:nvPr/>
+      </p:nvGrpSpPr>
+      <p:grpSpPr>
+        <a:xfrm>
+          <a:off x="0" y="0"/>
+          <a:ext cx="0" cy="0"/>
+          <a:chOff x="0" y="0"/>
+          <a:chExt cx="0" cy="0"/>
+        </a:xfrm>
+      </p:grpSpPr>
+      <p:pic>
+        <p:nvPicPr>
+          <p:cNvPr id="3" name="Resim 2">
+            <a:extLst>
+              <a:ext uri="{FF2B5EF4-FFF2-40B4-BE49-F238E27FC236}">
+                <a16:creationId xmlns:a16="http://schemas.microsoft.com/office/drawing/2014/main" id="{589C5521-620E-4BF1-9A81-1C33BA0F26F5}"/>
+              </a:ext>
+            </a:extLst>
+          </p:cNvPr>
+          <p:cNvPicPr>
+            <a:picLocks noChangeAspect="1"/>
+          </p:cNvPicPr>
+          <p:nvPr/>
+        </p:nvPicPr>
+        <p:blipFill>
+          <a:blip r:embed="rId2"/>
+          <a:stretch>
+            <a:fillRect/>
+          </a:stretch>
+        </p:blipFill>
+        <p:spPr>
+          <a:xfrm>
+            <a:off x="0" y="1673"/>
+            <a:ext cx="12192000" cy="6854653"/>
+          </a:xfrm>
+          <a:prstGeom prst="rect">
+            <a:avLst/>
+          </a:prstGeom>
+        </p:spPr>
+      </p:pic>
+    </p:spTree>
+    <p:extLst>
+      <p:ext uri="{BB962C8B-B14F-4D97-AF65-F5344CB8AC3E}">
+        <p14:creationId xmlns:p14="http://schemas.microsoft.com/office/powerpoint/2010/main" val="489183721"/>
+      </p:ext>
+    </p:extLst>
+  </p:cSld>
+  <p:clrMapOvr>
+    <a:masterClrMapping/>
+  </p:clrMapOvr>
+</p:sld>
+</file>
+
+<file path=ppt/slides/slide25.xml><?xml version="1.0" encoding="utf-8"?>
+<p:sld xmlns:a="http://schemas.openxmlformats.org/drawingml/2006/main" xmlns:r="http://schemas.openxmlformats.org/officeDocument/2006/relationships" xmlns:p="http://schemas.openxmlformats.org/presentationml/2006/main">
+  <p:cSld>
+    <p:spTree>
+      <p:nvGrpSpPr>
+        <p:cNvPr id="1" name=""/>
+        <p:cNvGrpSpPr/>
+        <p:nvPr/>
+      </p:nvGrpSpPr>
+      <p:grpSpPr>
+        <a:xfrm>
+          <a:off x="0" y="0"/>
+          <a:ext cx="0" cy="0"/>
+          <a:chOff x="0" y="0"/>
+          <a:chExt cx="0" cy="0"/>
+        </a:xfrm>
+      </p:grpSpPr>
+      <p:pic>
+        <p:nvPicPr>
+          <p:cNvPr id="3" name="Resim 2">
+            <a:extLst>
+              <a:ext uri="{FF2B5EF4-FFF2-40B4-BE49-F238E27FC236}">
+                <a16:creationId xmlns:a16="http://schemas.microsoft.com/office/drawing/2014/main" id="{6347D285-E98E-46A6-8274-50043990D870}"/>
+              </a:ext>
+            </a:extLst>
+          </p:cNvPr>
+          <p:cNvPicPr>
+            <a:picLocks noChangeAspect="1"/>
+          </p:cNvPicPr>
+          <p:nvPr/>
+        </p:nvPicPr>
+        <p:blipFill>
+          <a:blip r:embed="rId2"/>
+          <a:stretch>
+            <a:fillRect/>
+          </a:stretch>
+        </p:blipFill>
+        <p:spPr>
+          <a:xfrm>
+            <a:off x="0" y="1673"/>
+            <a:ext cx="12192000" cy="6854653"/>
+          </a:xfrm>
+          <a:prstGeom prst="rect">
+            <a:avLst/>
+          </a:prstGeom>
+        </p:spPr>
+      </p:pic>
+      <p:pic>
+        <p:nvPicPr>
+          <p:cNvPr id="5" name="Resim 4">
+            <a:extLst>
+              <a:ext uri="{FF2B5EF4-FFF2-40B4-BE49-F238E27FC236}">
+                <a16:creationId xmlns:a16="http://schemas.microsoft.com/office/drawing/2014/main" id="{4F19CC0A-D5E5-4C6B-BD61-3E3EE2B563AD}"/>
+              </a:ext>
+            </a:extLst>
+          </p:cNvPr>
+          <p:cNvPicPr>
+            <a:picLocks noChangeAspect="1"/>
+          </p:cNvPicPr>
+          <p:nvPr/>
+        </p:nvPicPr>
+        <p:blipFill rotWithShape="1">
+          <a:blip r:embed="rId3"/>
+          <a:srcRect l="25615" r="17846" b="59594"/>
+          <a:stretch/>
+        </p:blipFill>
+        <p:spPr>
+          <a:xfrm>
+            <a:off x="4923693" y="2196234"/>
+            <a:ext cx="6893169" cy="2769662"/>
+          </a:xfrm>
+          <a:prstGeom prst="rect">
+            <a:avLst/>
+          </a:prstGeom>
+          <a:solidFill>
+            <a:srgbClr val="FFFFFF">
+              <a:shade val="85000"/>
+            </a:srgbClr>
+          </a:solidFill>
+          <a:ln w="88900" cap="sq">
+            <a:solidFill>
+              <a:srgbClr val="FFFFFF"/>
+            </a:solidFill>
+            <a:miter lim="800000"/>
+          </a:ln>
+          <a:effectLst>
+            <a:outerShdw blurRad="55000" dist="18000" dir="5400000" algn="tl" rotWithShape="0">
+              <a:srgbClr val="000000">
+                <a:alpha val="40000"/>
+              </a:srgbClr>
+            </a:outerShdw>
+          </a:effectLst>
+          <a:scene3d>
+            <a:camera prst="orthographicFront"/>
+            <a:lightRig rig="twoPt" dir="t">
+              <a:rot lat="0" lon="0" rev="7200000"/>
+            </a:lightRig>
+          </a:scene3d>
+          <a:sp3d>
+            <a:bevelT w="25400" h="19050"/>
+            <a:contourClr>
+              <a:srgbClr val="FFFFFF"/>
+            </a:contourClr>
+          </a:sp3d>
+        </p:spPr>
+      </p:pic>
+    </p:spTree>
+    <p:extLst>
+      <p:ext uri="{BB962C8B-B14F-4D97-AF65-F5344CB8AC3E}">
+        <p14:creationId xmlns:p14="http://schemas.microsoft.com/office/powerpoint/2010/main" val="4271313626"/>
+      </p:ext>
+    </p:extLst>
+  </p:cSld>
+  <p:clrMapOvr>
+    <a:masterClrMapping/>
+  </p:clrMapOvr>
+</p:sld>
+</file>
+
+<file path=ppt/slides/slide26.xml><?xml version="1.0" encoding="utf-8"?>
+<p:sld xmlns:a="http://schemas.openxmlformats.org/drawingml/2006/main" xmlns:r="http://schemas.openxmlformats.org/officeDocument/2006/relationships" xmlns:p="http://schemas.openxmlformats.org/presentationml/2006/main">
+  <p:cSld>
+    <p:spTree>
+      <p:nvGrpSpPr>
+        <p:cNvPr id="1" name=""/>
+        <p:cNvGrpSpPr/>
+        <p:nvPr/>
+      </p:nvGrpSpPr>
+      <p:grpSpPr>
+        <a:xfrm>
+          <a:off x="0" y="0"/>
+          <a:ext cx="0" cy="0"/>
+          <a:chOff x="0" y="0"/>
+          <a:chExt cx="0" cy="0"/>
+        </a:xfrm>
+      </p:grpSpPr>
+      <p:pic>
+        <p:nvPicPr>
+          <p:cNvPr id="3" name="Resim 2">
+            <a:extLst>
+              <a:ext uri="{FF2B5EF4-FFF2-40B4-BE49-F238E27FC236}">
+                <a16:creationId xmlns:a16="http://schemas.microsoft.com/office/drawing/2014/main" id="{B7081DDA-4B61-4842-91BB-FBFF50327661}"/>
+              </a:ext>
+            </a:extLst>
+          </p:cNvPr>
+          <p:cNvPicPr>
+            <a:picLocks noChangeAspect="1"/>
+          </p:cNvPicPr>
+          <p:nvPr/>
+        </p:nvPicPr>
+        <p:blipFill>
+          <a:blip r:embed="rId2"/>
+          <a:stretch>
+            <a:fillRect/>
+          </a:stretch>
+        </p:blipFill>
+        <p:spPr>
+          <a:xfrm>
+            <a:off x="0" y="1673"/>
+            <a:ext cx="12192000" cy="6854653"/>
+          </a:xfrm>
+          <a:prstGeom prst="rect">
+            <a:avLst/>
+          </a:prstGeom>
+        </p:spPr>
+      </p:pic>
+      <p:pic>
+        <p:nvPicPr>
+          <p:cNvPr id="5" name="Resim 4">
+            <a:extLst>
+              <a:ext uri="{FF2B5EF4-FFF2-40B4-BE49-F238E27FC236}">
+                <a16:creationId xmlns:a16="http://schemas.microsoft.com/office/drawing/2014/main" id="{488CF480-D097-4899-94C4-C86FA3744E56}"/>
+              </a:ext>
+            </a:extLst>
+          </p:cNvPr>
+          <p:cNvPicPr>
+            <a:picLocks noChangeAspect="1"/>
+          </p:cNvPicPr>
+          <p:nvPr/>
+        </p:nvPicPr>
+        <p:blipFill>
+          <a:blip r:embed="rId3">
+            <a:extLst>
+              <a:ext uri="{28A0092B-C50C-407E-A947-70E740481C1C}">
+                <a14:useLocalDpi xmlns:a14="http://schemas.microsoft.com/office/drawing/2010/main" val="0"/>
+              </a:ext>
+            </a:extLst>
+          </a:blip>
+          <a:stretch>
+            <a:fillRect/>
+          </a:stretch>
+        </p:blipFill>
+        <p:spPr>
+          <a:xfrm>
+            <a:off x="1380467" y="302751"/>
+            <a:ext cx="9431066" cy="1019317"/>
+          </a:xfrm>
+          <a:prstGeom prst="rect">
+            <a:avLst/>
+          </a:prstGeom>
+        </p:spPr>
+      </p:pic>
+    </p:spTree>
+    <p:extLst>
+      <p:ext uri="{BB962C8B-B14F-4D97-AF65-F5344CB8AC3E}">
+        <p14:creationId xmlns:p14="http://schemas.microsoft.com/office/powerpoint/2010/main" val="3463888345"/>
+      </p:ext>
+    </p:extLst>
+  </p:cSld>
+  <p:clrMapOvr>
+    <a:masterClrMapping/>
+  </p:clrMapOvr>
+</p:sld>
+</file>
+
+<file path=ppt/slides/slide27.xml><?xml version="1.0" encoding="utf-8"?>
+<p:sld xmlns:a="http://schemas.openxmlformats.org/drawingml/2006/main" xmlns:r="http://schemas.openxmlformats.org/officeDocument/2006/relationships" xmlns:p="http://schemas.openxmlformats.org/presentationml/2006/main">
+  <p:cSld>
+    <p:spTree>
+      <p:nvGrpSpPr>
+        <p:cNvPr id="1" name=""/>
+        <p:cNvGrpSpPr/>
+        <p:nvPr/>
+      </p:nvGrpSpPr>
+      <p:grpSpPr>
+        <a:xfrm>
+          <a:off x="0" y="0"/>
+          <a:ext cx="0" cy="0"/>
+          <a:chOff x="0" y="0"/>
+          <a:chExt cx="0" cy="0"/>
+        </a:xfrm>
+      </p:grpSpPr>
+      <p:pic>
+        <p:nvPicPr>
+          <p:cNvPr id="3" name="Resim 2">
+            <a:extLst>
+              <a:ext uri="{FF2B5EF4-FFF2-40B4-BE49-F238E27FC236}">
+                <a16:creationId xmlns:a16="http://schemas.microsoft.com/office/drawing/2014/main" id="{961E9FBC-0361-43E9-BCD8-B6A4EBDD8431}"/>
+              </a:ext>
+            </a:extLst>
+          </p:cNvPr>
+          <p:cNvPicPr>
+            <a:picLocks noChangeAspect="1"/>
+          </p:cNvPicPr>
+          <p:nvPr/>
+        </p:nvPicPr>
+        <p:blipFill rotWithShape="1">
+          <a:blip r:embed="rId2"/>
+          <a:srcRect l="55385" t="36506"/>
+          <a:stretch/>
+        </p:blipFill>
+        <p:spPr>
+          <a:xfrm>
+            <a:off x="3376246" y="1252861"/>
+            <a:ext cx="5439508" cy="4352277"/>
+          </a:xfrm>
+          <a:prstGeom prst="rect">
+            <a:avLst/>
+          </a:prstGeom>
+        </p:spPr>
+      </p:pic>
+    </p:spTree>
+    <p:extLst>
+      <p:ext uri="{BB962C8B-B14F-4D97-AF65-F5344CB8AC3E}">
+        <p14:creationId xmlns:p14="http://schemas.microsoft.com/office/powerpoint/2010/main" val="1670336459"/>
+      </p:ext>
+    </p:extLst>
+  </p:cSld>
+  <p:clrMapOvr>
+    <a:masterClrMapping/>
+  </p:clrMapOvr>
+</p:sld>
+</file>
+
+<file path=ppt/slides/slide28.xml><?xml version="1.0" encoding="utf-8"?>
+<p:sld xmlns:a="http://schemas.openxmlformats.org/drawingml/2006/main" xmlns:r="http://schemas.openxmlformats.org/officeDocument/2006/relationships" xmlns:p="http://schemas.openxmlformats.org/presentationml/2006/main">
+  <p:cSld>
+    <p:spTree>
+      <p:nvGrpSpPr>
+        <p:cNvPr id="1" name=""/>
+        <p:cNvGrpSpPr/>
+        <p:nvPr/>
+      </p:nvGrpSpPr>
+      <p:grpSpPr>
+        <a:xfrm>
+          <a:off x="0" y="0"/>
+          <a:ext cx="0" cy="0"/>
+          <a:chOff x="0" y="0"/>
+          <a:chExt cx="0" cy="0"/>
+        </a:xfrm>
+      </p:grpSpPr>
+      <p:sp>
+        <p:nvSpPr>
+          <p:cNvPr id="2" name="Metin kutusu 1">
+            <a:extLst>
+              <a:ext uri="{FF2B5EF4-FFF2-40B4-BE49-F238E27FC236}">
+                <a16:creationId xmlns:a16="http://schemas.microsoft.com/office/drawing/2014/main" id="{ACFB30C1-6C87-4182-AF21-294B9AE580A4}"/>
+              </a:ext>
+            </a:extLst>
+          </p:cNvPr>
+          <p:cNvSpPr txBox="1"/>
+          <p:nvPr/>
+        </p:nvSpPr>
+        <p:spPr>
+          <a:xfrm>
+            <a:off x="207958" y="0"/>
+            <a:ext cx="7363106" cy="369332"/>
+          </a:xfrm>
+          <a:prstGeom prst="rect">
+            <a:avLst/>
+          </a:prstGeom>
+          <a:noFill/>
+        </p:spPr>
+        <p:txBody>
+          <a:bodyPr wrap="none" rtlCol="0">
+            <a:spAutoFit/>
+          </a:bodyPr>
+          <a:lstStyle/>
+          <a:p>
+            <a:r>
+              <a:rPr lang="tr-TR" dirty="0"/>
+              <a:t>SONRADAN EKLENEN DOSYALARI VE DEĞİŞİKLİKLERİ GITHUB'A EKLEMEK İÇİN</a:t>
+            </a:r>
+          </a:p>
+        </p:txBody>
+      </p:sp>
+      <p:grpSp>
+        <p:nvGrpSpPr>
+          <p:cNvPr id="10" name="Grup 9">
+            <a:extLst>
+              <a:ext uri="{FF2B5EF4-FFF2-40B4-BE49-F238E27FC236}">
+                <a16:creationId xmlns:a16="http://schemas.microsoft.com/office/drawing/2014/main" id="{D9EA0370-FD98-4BFF-B908-9222DDC5BEB0}"/>
+              </a:ext>
+            </a:extLst>
+          </p:cNvPr>
+          <p:cNvGrpSpPr/>
+          <p:nvPr/>
+        </p:nvGrpSpPr>
+        <p:grpSpPr>
+          <a:xfrm>
+            <a:off x="0" y="478509"/>
+            <a:ext cx="12192000" cy="6281017"/>
+            <a:chOff x="0" y="478509"/>
+            <a:chExt cx="12192000" cy="6281017"/>
+          </a:xfrm>
+        </p:grpSpPr>
+        <p:pic>
+          <p:nvPicPr>
+            <p:cNvPr id="5" name="Resim 4">
+              <a:extLst>
+                <a:ext uri="{FF2B5EF4-FFF2-40B4-BE49-F238E27FC236}">
+                  <a16:creationId xmlns:a16="http://schemas.microsoft.com/office/drawing/2014/main" id="{6506F02E-E724-42F4-8D81-6A473B1DB8BB}"/>
+                </a:ext>
+              </a:extLst>
+            </p:cNvPr>
+            <p:cNvPicPr>
+              <a:picLocks noChangeAspect="1"/>
+            </p:cNvPicPr>
+            <p:nvPr/>
+          </p:nvPicPr>
+          <p:blipFill rotWithShape="1">
+            <a:blip r:embed="rId2"/>
+            <a:srcRect r="50846" b="29221"/>
+            <a:stretch/>
+          </p:blipFill>
+          <p:spPr>
+            <a:xfrm>
+              <a:off x="0" y="478509"/>
+              <a:ext cx="5992837" cy="4851681"/>
+            </a:xfrm>
+            <a:prstGeom prst="rect">
+              <a:avLst/>
+            </a:prstGeom>
+          </p:spPr>
+        </p:pic>
+        <p:pic>
+          <p:nvPicPr>
+            <p:cNvPr id="7" name="Resim 6">
+              <a:extLst>
+                <a:ext uri="{FF2B5EF4-FFF2-40B4-BE49-F238E27FC236}">
+                  <a16:creationId xmlns:a16="http://schemas.microsoft.com/office/drawing/2014/main" id="{F4C4D786-81ED-473F-8420-7AED9DA98CC8}"/>
+                </a:ext>
+              </a:extLst>
+            </p:cNvPr>
+            <p:cNvPicPr>
+              <a:picLocks noChangeAspect="1"/>
+            </p:cNvPicPr>
+            <p:nvPr/>
+          </p:nvPicPr>
+          <p:blipFill rotWithShape="1">
+            <a:blip r:embed="rId3"/>
+            <a:srcRect l="1" t="1" r="48731" b="29220"/>
+            <a:stretch/>
+          </p:blipFill>
+          <p:spPr>
+            <a:xfrm>
+              <a:off x="5941256" y="478509"/>
+              <a:ext cx="6250744" cy="4851681"/>
+            </a:xfrm>
+            <a:prstGeom prst="rect">
+              <a:avLst/>
+            </a:prstGeom>
+          </p:spPr>
+        </p:pic>
+        <p:pic>
+          <p:nvPicPr>
+            <p:cNvPr id="9" name="Resim 8">
+              <a:extLst>
+                <a:ext uri="{FF2B5EF4-FFF2-40B4-BE49-F238E27FC236}">
+                  <a16:creationId xmlns:a16="http://schemas.microsoft.com/office/drawing/2014/main" id="{8D8D7405-73D7-499B-9FB5-0DF35D9879D1}"/>
+                </a:ext>
+              </a:extLst>
+            </p:cNvPr>
+            <p:cNvPicPr>
+              <a:picLocks noChangeAspect="1"/>
+            </p:cNvPicPr>
+            <p:nvPr/>
+          </p:nvPicPr>
+          <p:blipFill rotWithShape="1">
+            <a:blip r:embed="rId4"/>
+            <a:srcRect b="83606"/>
+            <a:stretch/>
+          </p:blipFill>
+          <p:spPr>
+            <a:xfrm>
+              <a:off x="0" y="5635784"/>
+              <a:ext cx="12192000" cy="1123742"/>
+            </a:xfrm>
+            <a:prstGeom prst="rect">
+              <a:avLst/>
+            </a:prstGeom>
+          </p:spPr>
+        </p:pic>
+      </p:grpSp>
+    </p:spTree>
+    <p:extLst>
+      <p:ext uri="{BB962C8B-B14F-4D97-AF65-F5344CB8AC3E}">
+        <p14:creationId xmlns:p14="http://schemas.microsoft.com/office/powerpoint/2010/main" val="3947375104"/>
+      </p:ext>
+    </p:extLst>
+  </p:cSld>
+  <p:clrMapOvr>
+    <a:masterClrMapping/>
+  </p:clrMapOvr>
+</p:sld>
+</file>
+
+<file path=ppt/slides/slide29.xml><?xml version="1.0" encoding="utf-8"?>
+<p:sld xmlns:a="http://schemas.openxmlformats.org/drawingml/2006/main" xmlns:r="http://schemas.openxmlformats.org/officeDocument/2006/relationships" xmlns:p="http://schemas.openxmlformats.org/presentationml/2006/main">
+  <p:cSld>
+    <p:spTree>
+      <p:nvGrpSpPr>
+        <p:cNvPr id="1" name=""/>
+        <p:cNvGrpSpPr/>
+        <p:nvPr/>
+      </p:nvGrpSpPr>
+      <p:grpSpPr>
+        <a:xfrm>
+          <a:off x="0" y="0"/>
+          <a:ext cx="0" cy="0"/>
+          <a:chOff x="0" y="0"/>
+          <a:chExt cx="0" cy="0"/>
+        </a:xfrm>
+      </p:grpSpPr>
+      <p:pic>
+        <p:nvPicPr>
+          <p:cNvPr id="5" name="Resim 4">
+            <a:extLst>
+              <a:ext uri="{FF2B5EF4-FFF2-40B4-BE49-F238E27FC236}">
+                <a16:creationId xmlns:a16="http://schemas.microsoft.com/office/drawing/2014/main" id="{B8F71C7D-987F-49BE-B570-3B96F90CAC32}"/>
+              </a:ext>
+            </a:extLst>
+          </p:cNvPr>
+          <p:cNvPicPr>
+            <a:picLocks noChangeAspect="1"/>
+          </p:cNvPicPr>
+          <p:nvPr/>
+        </p:nvPicPr>
+        <p:blipFill rotWithShape="1">
+          <a:blip r:embed="rId2"/>
+          <a:srcRect r="55000" b="30812"/>
+          <a:stretch/>
+        </p:blipFill>
+        <p:spPr>
+          <a:xfrm>
+            <a:off x="0" y="1673"/>
+            <a:ext cx="5486400" cy="4742605"/>
+          </a:xfrm>
+          <a:prstGeom prst="rect">
+            <a:avLst/>
+          </a:prstGeom>
+        </p:spPr>
+      </p:pic>
+      <p:pic>
+        <p:nvPicPr>
+          <p:cNvPr id="7" name="Resim 6">
+            <a:extLst>
+              <a:ext uri="{FF2B5EF4-FFF2-40B4-BE49-F238E27FC236}">
+                <a16:creationId xmlns:a16="http://schemas.microsoft.com/office/drawing/2014/main" id="{A5E36C5A-0B55-4D52-B204-EAC52A05B2BA}"/>
+              </a:ext>
+            </a:extLst>
+          </p:cNvPr>
+          <p:cNvPicPr>
+            <a:picLocks noChangeAspect="1"/>
+          </p:cNvPicPr>
+          <p:nvPr/>
+        </p:nvPicPr>
+        <p:blipFill rotWithShape="1">
+          <a:blip r:embed="rId3"/>
+          <a:srcRect l="4565" t="37868" r="27935" b="7419"/>
+          <a:stretch/>
+        </p:blipFill>
+        <p:spPr>
+          <a:xfrm>
+            <a:off x="3962400" y="3105963"/>
+            <a:ext cx="8229600" cy="3750364"/>
+          </a:xfrm>
+          <a:prstGeom prst="rect">
+            <a:avLst/>
+          </a:prstGeom>
+        </p:spPr>
+      </p:pic>
+      <p:sp>
+        <p:nvSpPr>
+          <p:cNvPr id="8" name="Metin kutusu 7">
+            <a:extLst>
+              <a:ext uri="{FF2B5EF4-FFF2-40B4-BE49-F238E27FC236}">
+                <a16:creationId xmlns:a16="http://schemas.microsoft.com/office/drawing/2014/main" id="{90BB9E0A-9787-4167-B15D-C662C4A55DD1}"/>
+              </a:ext>
+            </a:extLst>
+          </p:cNvPr>
+          <p:cNvSpPr txBox="1"/>
+          <p:nvPr/>
+        </p:nvSpPr>
+        <p:spPr>
+          <a:xfrm>
+            <a:off x="6645072" y="3273287"/>
+            <a:ext cx="2194127" cy="769441"/>
+          </a:xfrm>
+          <a:prstGeom prst="rect">
+            <a:avLst/>
+          </a:prstGeom>
+        </p:spPr>
+        <p:style>
+          <a:lnRef idx="2">
+            <a:schemeClr val="accent3"/>
+          </a:lnRef>
+          <a:fillRef idx="1">
+            <a:schemeClr val="lt1"/>
+          </a:fillRef>
+          <a:effectRef idx="0">
+            <a:schemeClr val="accent3"/>
+          </a:effectRef>
+          <a:fontRef idx="minor">
+            <a:schemeClr val="dk1"/>
+          </a:fontRef>
+        </p:style>
+        <p:txBody>
+          <a:bodyPr wrap="none" rtlCol="0">
+            <a:spAutoFit/>
+          </a:bodyPr>
+          <a:lstStyle/>
+          <a:p>
+            <a:r>
+              <a:rPr lang="tr-TR" sz="4400" dirty="0"/>
+              <a:t>ve sonuç</a:t>
+            </a:r>
+          </a:p>
+        </p:txBody>
+      </p:sp>
+    </p:spTree>
+    <p:extLst>
+      <p:ext uri="{BB962C8B-B14F-4D97-AF65-F5344CB8AC3E}">
+        <p14:creationId xmlns:p14="http://schemas.microsoft.com/office/powerpoint/2010/main" val="3128381474"/>
+      </p:ext>
+    </p:extLst>
+  </p:cSld>
+  <p:clrMapOvr>
+    <a:masterClrMapping/>
+  </p:clrMapOvr>
+</p:sld>
+</file>
+
 <file path=ppt/slides/slide3.xml><?xml version="1.0" encoding="utf-8"?>
 <p:sld xmlns:a="http://schemas.openxmlformats.org/drawingml/2006/main" xmlns:r="http://schemas.openxmlformats.org/officeDocument/2006/relationships" xmlns:p="http://schemas.openxmlformats.org/presentationml/2006/main">
   <p:cSld>

</xml_diff>